<commit_message>
Update Sjoberg - RMed 2023 CRC Poster.pptx
</commit_message>
<xml_diff>
--- a/R-Med Poster 2023/Sjoberg - RMed 2023 CRC Poster.pptx
+++ b/R-Med Poster 2023/Sjoberg - RMed 2023 CRC Poster.pptx
@@ -2631,8 +2631,8 @@
         </p:blipFill>
         <p:spPr>
           <a:xfrm>
-            <a:off x="17136846" y="12114647"/>
-            <a:ext cx="13441929" cy="9262505"/>
+            <a:off x="16516363" y="12016676"/>
+            <a:ext cx="14062413" cy="9690065"/>
           </a:xfrm>
           <a:prstGeom prst="rect">
             <a:avLst/>

</xml_diff>